<commit_message>
Heat capacity v1.5.1. Modeling of strain distribution in Y-TmVO4: created new functions including offset strain. Works well, but then I wonder about the meaning of a distribution of Schottky anomalies with average related to the offset strain...
</commit_message>
<xml_diff>
--- a/Matlab_data_analysis/Cp_analysis/AnalyzeCpDoping/Cp_random_strains/TmVO4_Cp_random_strains_analysis_notes.pptx
+++ b/Matlab_data_analysis/Cp_analysis/AnalyzeCpDoping/Cp_random_strains/TmVO4_Cp_random_strains_analysis_notes.pptx
@@ -282,7 +282,7 @@
               <a:pPr>
                 <a:defRPr/>
               </a:pPr>
-              <a:t>2019-04-05</a:t>
+              <a:t>2019-04-11</a:t>
             </a:fld>
             <a:endParaRPr lang="en-US" altLang="en-US"/>
           </a:p>
@@ -520,7 +520,7 @@
               <a:pPr>
                 <a:defRPr/>
               </a:pPr>
-              <a:t>2019-04-05</a:t>
+              <a:t>2019-04-11</a:t>
             </a:fld>
             <a:endParaRPr lang="en-US" altLang="en-US"/>
           </a:p>
@@ -6585,8 +6585,8 @@
           </a:p>
         </p:txBody>
       </p:sp>
-      <mc:AlternateContent xmlns:mc="http://schemas.openxmlformats.org/markup-compatibility/2006">
-        <mc:Choice xmlns:a14="http://schemas.microsoft.com/office/drawing/2010/main" Requires="a14">
+      <mc:AlternateContent xmlns:mc="http://schemas.openxmlformats.org/markup-compatibility/2006" xmlns:a14="http://schemas.microsoft.com/office/drawing/2010/main">
+        <mc:Choice Requires="a14">
           <p:sp>
             <p:nvSpPr>
               <p:cNvPr id="3" name="Content Placeholder 2">
@@ -6797,7 +6797,7 @@
             </p:txBody>
           </p:sp>
         </mc:Choice>
-        <mc:Fallback>
+        <mc:Fallback xmlns="">
           <p:sp>
             <p:nvSpPr>
               <p:cNvPr id="3" name="Content Placeholder 2">
@@ -7061,8 +7061,8 @@
           </a:p>
         </p:txBody>
       </p:sp>
-      <mc:AlternateContent xmlns:mc="http://schemas.openxmlformats.org/markup-compatibility/2006">
-        <mc:Choice xmlns:a14="http://schemas.microsoft.com/office/drawing/2010/main" Requires="a14">
+      <mc:AlternateContent xmlns:mc="http://schemas.openxmlformats.org/markup-compatibility/2006" xmlns:a14="http://schemas.microsoft.com/office/drawing/2010/main">
+        <mc:Choice Requires="a14">
           <p:sp>
             <p:nvSpPr>
               <p:cNvPr id="3" name="Content Placeholder 2">
@@ -7205,7 +7205,7 @@
             </p:txBody>
           </p:sp>
         </mc:Choice>
-        <mc:Fallback>
+        <mc:Fallback xmlns="">
           <p:sp>
             <p:nvSpPr>
               <p:cNvPr id="3" name="Content Placeholder 2">
@@ -7310,48 +7310,449 @@
           </a:p>
         </p:txBody>
       </p:sp>
-      <p:sp>
-        <p:nvSpPr>
-          <p:cNvPr id="3" name="Content Placeholder 2">
-            <a:extLst>
-              <a:ext uri="{FF2B5EF4-FFF2-40B4-BE49-F238E27FC236}">
-                <a16:creationId xmlns:a16="http://schemas.microsoft.com/office/drawing/2014/main" id="{CA1C414D-E74A-4D4C-B99A-1D30EC6646D2}"/>
-              </a:ext>
-            </a:extLst>
-          </p:cNvPr>
-          <p:cNvSpPr>
-            <a:spLocks noGrp="1"/>
-          </p:cNvSpPr>
-          <p:nvPr>
-            <p:ph sz="quarter" idx="10"/>
-          </p:nvPr>
-        </p:nvSpPr>
-        <p:spPr/>
-        <p:txBody>
-          <a:bodyPr/>
-          <a:lstStyle/>
-          <a:p>
-            <a:pPr>
-              <a:buFont typeface="Arial" panose="020B0604020202020204" pitchFamily="34" charset="0"/>
-              <a:buChar char="•"/>
-            </a:pPr>
-            <a:r>
-              <a:rPr lang="en-US" dirty="0"/>
-              <a:t>See second slide about equation of phase boundary</a:t>
-            </a:r>
-          </a:p>
-          <a:p>
-            <a:pPr lvl="2">
-              <a:buFont typeface="Arial" panose="020B0604020202020204" pitchFamily="34" charset="0"/>
-              <a:buChar char="•"/>
-            </a:pPr>
-            <a:r>
-              <a:rPr lang="en-US" dirty="0"/>
-              <a:t>This is introduced in the paper by Kasten et al.</a:t>
-            </a:r>
-          </a:p>
-        </p:txBody>
-      </p:sp>
+      <mc:AlternateContent xmlns:mc="http://schemas.openxmlformats.org/markup-compatibility/2006">
+        <mc:Choice xmlns:a14="http://schemas.microsoft.com/office/drawing/2010/main" Requires="a14">
+          <p:sp>
+            <p:nvSpPr>
+              <p:cNvPr id="3" name="Content Placeholder 2">
+                <a:extLst>
+                  <a:ext uri="{FF2B5EF4-FFF2-40B4-BE49-F238E27FC236}">
+                    <a16:creationId xmlns:a16="http://schemas.microsoft.com/office/drawing/2014/main" id="{CA1C414D-E74A-4D4C-B99A-1D30EC6646D2}"/>
+                  </a:ext>
+                </a:extLst>
+              </p:cNvPr>
+              <p:cNvSpPr>
+                <a:spLocks noGrp="1"/>
+              </p:cNvSpPr>
+              <p:nvPr>
+                <p:ph sz="quarter" idx="10"/>
+              </p:nvPr>
+            </p:nvSpPr>
+            <p:spPr/>
+            <p:txBody>
+              <a:bodyPr/>
+              <a:lstStyle/>
+              <a:p>
+                <a:pPr>
+                  <a:buFont typeface="Arial" panose="020B0604020202020204" pitchFamily="34" charset="0"/>
+                  <a:buChar char="•"/>
+                </a:pPr>
+                <a:r>
+                  <a:rPr lang="en-US" dirty="0"/>
+                  <a:t>See second slide about equation of phase boundary</a:t>
+                </a:r>
+              </a:p>
+              <a:p>
+                <a:pPr lvl="2">
+                  <a:buFont typeface="Arial" panose="020B0604020202020204" pitchFamily="34" charset="0"/>
+                  <a:buChar char="•"/>
+                </a:pPr>
+                <a:r>
+                  <a:rPr lang="en-US" dirty="0"/>
+                  <a:t>This is introduced in the paper by Kasten et al. 1987</a:t>
+                </a:r>
+              </a:p>
+              <a:p>
+                <a:pPr>
+                  <a:buFont typeface="Arial" panose="020B0604020202020204" pitchFamily="34" charset="0"/>
+                  <a:buChar char="•"/>
+                </a:pPr>
+                <a:r>
+                  <a:rPr lang="en-US" dirty="0"/>
+                  <a:t>Simply replace </a:t>
+                </a:r>
+                <a14:m>
+                  <m:oMath xmlns:m="http://schemas.openxmlformats.org/officeDocument/2006/math">
+                    <m:sSup>
+                      <m:sSupPr>
+                        <m:ctrlPr>
+                          <a:rPr lang="en-US" b="0" i="1" smtClean="0">
+                            <a:latin typeface="Cambria Math" panose="02040503050406030204" pitchFamily="18" charset="0"/>
+                          </a:rPr>
+                        </m:ctrlPr>
+                      </m:sSupPr>
+                      <m:e>
+                        <m:func>
+                          <m:funcPr>
+                            <m:ctrlPr>
+                              <a:rPr lang="en-US" b="0" i="1" smtClean="0">
+                                <a:latin typeface="Cambria Math" panose="02040503050406030204" pitchFamily="18" charset="0"/>
+                              </a:rPr>
+                            </m:ctrlPr>
+                          </m:funcPr>
+                          <m:fName>
+                            <m:r>
+                              <m:rPr>
+                                <m:sty m:val="p"/>
+                              </m:rPr>
+                              <a:rPr lang="en-US" b="0" i="0" smtClean="0">
+                                <a:latin typeface="Cambria Math" panose="02040503050406030204" pitchFamily="18" charset="0"/>
+                              </a:rPr>
+                              <m:t>exp</m:t>
+                            </m:r>
+                          </m:fName>
+                          <m:e>
+                            <m:r>
+                              <a:rPr lang="en-US" b="0" i="1" smtClean="0">
+                                <a:latin typeface="Cambria Math" panose="02040503050406030204" pitchFamily="18" charset="0"/>
+                              </a:rPr>
+                              <m:t>−</m:t>
+                            </m:r>
+                            <m:d>
+                              <m:dPr>
+                                <m:ctrlPr>
+                                  <a:rPr lang="en-US" b="0" i="1" smtClean="0">
+                                    <a:latin typeface="Cambria Math" panose="02040503050406030204" pitchFamily="18" charset="0"/>
+                                  </a:rPr>
+                                </m:ctrlPr>
+                              </m:dPr>
+                              <m:e>
+                                <m:f>
+                                  <m:fPr>
+                                    <m:ctrlPr>
+                                      <a:rPr lang="en-US" b="0" i="1" smtClean="0">
+                                        <a:latin typeface="Cambria Math" panose="02040503050406030204" pitchFamily="18" charset="0"/>
+                                      </a:rPr>
+                                    </m:ctrlPr>
+                                  </m:fPr>
+                                  <m:num>
+                                    <m:r>
+                                      <m:rPr>
+                                        <m:sty m:val="p"/>
+                                      </m:rPr>
+                                      <a:rPr lang="en-US" b="0" i="0" smtClean="0">
+                                        <a:latin typeface="Cambria Math" panose="02040503050406030204" pitchFamily="18" charset="0"/>
+                                      </a:rPr>
+                                      <m:t>Δ</m:t>
+                                    </m:r>
+                                  </m:num>
+                                  <m:den>
+                                    <m:sSub>
+                                      <m:sSubPr>
+                                        <m:ctrlPr>
+                                          <a:rPr lang="en-US" b="0" i="1" smtClean="0">
+                                            <a:latin typeface="Cambria Math" panose="02040503050406030204" pitchFamily="18" charset="0"/>
+                                          </a:rPr>
+                                        </m:ctrlPr>
+                                      </m:sSubPr>
+                                      <m:e>
+                                        <m:r>
+                                          <m:rPr>
+                                            <m:sty m:val="p"/>
+                                          </m:rPr>
+                                          <a:rPr lang="en-US" b="0" i="0" smtClean="0">
+                                            <a:latin typeface="Cambria Math" panose="02040503050406030204" pitchFamily="18" charset="0"/>
+                                          </a:rPr>
+                                          <m:t>Δ</m:t>
+                                        </m:r>
+                                      </m:e>
+                                      <m:sub>
+                                        <m:r>
+                                          <a:rPr lang="en-US" b="0" i="1" smtClean="0">
+                                            <a:latin typeface="Cambria Math" panose="02040503050406030204" pitchFamily="18" charset="0"/>
+                                          </a:rPr>
+                                          <m:t>0</m:t>
+                                        </m:r>
+                                      </m:sub>
+                                    </m:sSub>
+                                  </m:den>
+                                </m:f>
+                              </m:e>
+                            </m:d>
+                          </m:e>
+                        </m:func>
+                      </m:e>
+                      <m:sup>
+                        <m:r>
+                          <a:rPr lang="en-US" b="0" i="1" smtClean="0">
+                            <a:latin typeface="Cambria Math" panose="02040503050406030204" pitchFamily="18" charset="0"/>
+                          </a:rPr>
+                          <m:t>2</m:t>
+                        </m:r>
+                      </m:sup>
+                    </m:sSup>
+                  </m:oMath>
+                </a14:m>
+                <a:r>
+                  <a:rPr lang="en-US" dirty="0"/>
+                  <a:t> by </a:t>
+                </a:r>
+                <a14:m>
+                  <m:oMath xmlns:m="http://schemas.openxmlformats.org/officeDocument/2006/math">
+                    <m:func>
+                      <m:funcPr>
+                        <m:ctrlPr>
+                          <a:rPr lang="en-US" i="1">
+                            <a:latin typeface="Cambria Math" panose="02040503050406030204" pitchFamily="18" charset="0"/>
+                          </a:rPr>
+                        </m:ctrlPr>
+                      </m:funcPr>
+                      <m:fName>
+                        <m:r>
+                          <m:rPr>
+                            <m:sty m:val="p"/>
+                          </m:rPr>
+                          <a:rPr lang="en-US">
+                            <a:latin typeface="Cambria Math" panose="02040503050406030204" pitchFamily="18" charset="0"/>
+                          </a:rPr>
+                          <m:t>exp</m:t>
+                        </m:r>
+                      </m:fName>
+                      <m:e>
+                        <m:r>
+                          <a:rPr lang="en-US" i="1">
+                            <a:latin typeface="Cambria Math" panose="02040503050406030204" pitchFamily="18" charset="0"/>
+                          </a:rPr>
+                          <m:t>−</m:t>
+                        </m:r>
+                        <m:sSup>
+                          <m:sSupPr>
+                            <m:ctrlPr>
+                              <a:rPr lang="en-US" b="0" i="1" smtClean="0">
+                                <a:latin typeface="Cambria Math" panose="02040503050406030204" pitchFamily="18" charset="0"/>
+                              </a:rPr>
+                            </m:ctrlPr>
+                          </m:sSupPr>
+                          <m:e>
+                            <m:d>
+                              <m:dPr>
+                                <m:ctrlPr>
+                                  <a:rPr lang="en-US" i="1">
+                                    <a:latin typeface="Cambria Math" panose="02040503050406030204" pitchFamily="18" charset="0"/>
+                                  </a:rPr>
+                                </m:ctrlPr>
+                              </m:dPr>
+                              <m:e>
+                                <m:f>
+                                  <m:fPr>
+                                    <m:ctrlPr>
+                                      <a:rPr lang="en-US" i="1">
+                                        <a:latin typeface="Cambria Math" panose="02040503050406030204" pitchFamily="18" charset="0"/>
+                                      </a:rPr>
+                                    </m:ctrlPr>
+                                  </m:fPr>
+                                  <m:num>
+                                    <m:r>
+                                      <m:rPr>
+                                        <m:sty m:val="p"/>
+                                      </m:rPr>
+                                      <a:rPr lang="en-US">
+                                        <a:latin typeface="Cambria Math" panose="02040503050406030204" pitchFamily="18" charset="0"/>
+                                      </a:rPr>
+                                      <m:t>Δ</m:t>
+                                    </m:r>
+                                    <m:r>
+                                      <a:rPr lang="en-US" b="0" i="0" smtClean="0">
+                                        <a:latin typeface="Cambria Math" panose="02040503050406030204" pitchFamily="18" charset="0"/>
+                                      </a:rPr>
+                                      <m:t>−</m:t>
+                                    </m:r>
+                                    <m:sSub>
+                                      <m:sSubPr>
+                                        <m:ctrlPr>
+                                          <a:rPr lang="en-US" b="0" i="1" smtClean="0">
+                                            <a:latin typeface="Cambria Math" panose="02040503050406030204" pitchFamily="18" charset="0"/>
+                                          </a:rPr>
+                                        </m:ctrlPr>
+                                      </m:sSubPr>
+                                      <m:e>
+                                        <m:r>
+                                          <m:rPr>
+                                            <m:sty m:val="p"/>
+                                          </m:rPr>
+                                          <a:rPr lang="en-US" b="0" i="0" smtClean="0">
+                                            <a:latin typeface="Cambria Math" panose="02040503050406030204" pitchFamily="18" charset="0"/>
+                                          </a:rPr>
+                                          <m:t>Δ</m:t>
+                                        </m:r>
+                                      </m:e>
+                                      <m:sub>
+                                        <m:r>
+                                          <a:rPr lang="en-US" b="0" i="1" smtClean="0">
+                                            <a:latin typeface="Cambria Math" panose="02040503050406030204" pitchFamily="18" charset="0"/>
+                                          </a:rPr>
+                                          <m:t>𝑎</m:t>
+                                        </m:r>
+                                      </m:sub>
+                                    </m:sSub>
+                                  </m:num>
+                                  <m:den>
+                                    <m:sSub>
+                                      <m:sSubPr>
+                                        <m:ctrlPr>
+                                          <a:rPr lang="en-US" i="1">
+                                            <a:latin typeface="Cambria Math" panose="02040503050406030204" pitchFamily="18" charset="0"/>
+                                          </a:rPr>
+                                        </m:ctrlPr>
+                                      </m:sSubPr>
+                                      <m:e>
+                                        <m:r>
+                                          <m:rPr>
+                                            <m:sty m:val="p"/>
+                                          </m:rPr>
+                                          <a:rPr lang="en-US">
+                                            <a:latin typeface="Cambria Math" panose="02040503050406030204" pitchFamily="18" charset="0"/>
+                                          </a:rPr>
+                                          <m:t>Δ</m:t>
+                                        </m:r>
+                                      </m:e>
+                                      <m:sub>
+                                        <m:r>
+                                          <a:rPr lang="en-US" i="1">
+                                            <a:latin typeface="Cambria Math" panose="02040503050406030204" pitchFamily="18" charset="0"/>
+                                          </a:rPr>
+                                          <m:t>0</m:t>
+                                        </m:r>
+                                      </m:sub>
+                                    </m:sSub>
+                                  </m:den>
+                                </m:f>
+                              </m:e>
+                            </m:d>
+                          </m:e>
+                          <m:sup>
+                            <m:r>
+                              <a:rPr lang="en-US" b="0" i="1" smtClean="0">
+                                <a:latin typeface="Cambria Math" panose="02040503050406030204" pitchFamily="18" charset="0"/>
+                              </a:rPr>
+                              <m:t>2</m:t>
+                            </m:r>
+                          </m:sup>
+                        </m:sSup>
+                      </m:e>
+                    </m:func>
+                  </m:oMath>
+                </a14:m>
+                <a:endParaRPr lang="en-US" dirty="0"/>
+              </a:p>
+              <a:p>
+                <a:pPr lvl="2">
+                  <a:buFont typeface="Arial" panose="020B0604020202020204" pitchFamily="34" charset="0"/>
+                  <a:buChar char="•"/>
+                </a:pPr>
+                <a:r>
+                  <a:rPr lang="en-US" dirty="0"/>
+                  <a:t>Note: for negative values of </a:t>
+                </a:r>
+                <a14:m>
+                  <m:oMath xmlns:m="http://schemas.openxmlformats.org/officeDocument/2006/math">
+                    <m:sSub>
+                      <m:sSubPr>
+                        <m:ctrlPr>
+                          <a:rPr lang="en-US" b="0" i="1" smtClean="0">
+                            <a:latin typeface="Cambria Math" panose="02040503050406030204" pitchFamily="18" charset="0"/>
+                          </a:rPr>
+                        </m:ctrlPr>
+                      </m:sSubPr>
+                      <m:e>
+                        <m:r>
+                          <m:rPr>
+                            <m:sty m:val="p"/>
+                          </m:rPr>
+                          <a:rPr lang="en-US" b="0" i="0" smtClean="0">
+                            <a:latin typeface="Cambria Math" panose="02040503050406030204" pitchFamily="18" charset="0"/>
+                          </a:rPr>
+                          <m:t>Δ</m:t>
+                        </m:r>
+                      </m:e>
+                      <m:sub>
+                        <m:r>
+                          <a:rPr lang="en-US" b="0" i="1" smtClean="0">
+                            <a:latin typeface="Cambria Math" panose="02040503050406030204" pitchFamily="18" charset="0"/>
+                          </a:rPr>
+                          <m:t>𝑎</m:t>
+                        </m:r>
+                      </m:sub>
+                    </m:sSub>
+                  </m:oMath>
+                </a14:m>
+                <a:r>
+                  <a:rPr lang="en-US" dirty="0"/>
+                  <a:t>, the computation of the order parameter does not make sense; this is fine if </a:t>
+                </a:r>
+                <a14:m>
+                  <m:oMath xmlns:m="http://schemas.openxmlformats.org/officeDocument/2006/math">
+                    <m:r>
+                      <m:rPr>
+                        <m:sty m:val="p"/>
+                      </m:rPr>
+                      <a:rPr lang="en-US" b="0" i="0" smtClean="0">
+                        <a:latin typeface="Cambria Math" panose="02040503050406030204" pitchFamily="18" charset="0"/>
+                      </a:rPr>
+                      <m:t>Δ</m:t>
+                    </m:r>
+                  </m:oMath>
+                </a14:m>
+                <a:r>
+                  <a:rPr lang="en-US" dirty="0"/>
+                  <a:t> is the amplitude of the gap induced by local strains, but then why are we integrating over negative values of </a:t>
+                </a:r>
+                <a14:m>
+                  <m:oMath xmlns:m="http://schemas.openxmlformats.org/officeDocument/2006/math">
+                    <m:r>
+                      <m:rPr>
+                        <m:sty m:val="p"/>
+                      </m:rPr>
+                      <a:rPr lang="en-US" b="0" i="0" smtClean="0">
+                        <a:latin typeface="Cambria Math" panose="02040503050406030204" pitchFamily="18" charset="0"/>
+                      </a:rPr>
+                      <m:t>Δ</m:t>
+                    </m:r>
+                  </m:oMath>
+                </a14:m>
+                <a:r>
+                  <a:rPr lang="en-US" dirty="0"/>
+                  <a:t> </a:t>
+                </a:r>
+                <a:r>
+                  <a:rPr lang="en-US"/>
+                  <a:t>as well?</a:t>
+                </a:r>
+                <a:endParaRPr lang="en-US" dirty="0"/>
+              </a:p>
+            </p:txBody>
+          </p:sp>
+        </mc:Choice>
+        <mc:Fallback>
+          <p:sp>
+            <p:nvSpPr>
+              <p:cNvPr id="3" name="Content Placeholder 2">
+                <a:extLst>
+                  <a:ext uri="{FF2B5EF4-FFF2-40B4-BE49-F238E27FC236}">
+                    <a16:creationId xmlns:a16="http://schemas.microsoft.com/office/drawing/2014/main" id="{CA1C414D-E74A-4D4C-B99A-1D30EC6646D2}"/>
+                  </a:ext>
+                </a:extLst>
+              </p:cNvPr>
+              <p:cNvSpPr>
+                <a:spLocks noGrp="1" noRot="1" noChangeAspect="1" noMove="1" noResize="1" noEditPoints="1" noAdjustHandles="1" noChangeArrowheads="1" noChangeShapeType="1" noTextEdit="1"/>
+              </p:cNvSpPr>
+              <p:nvPr>
+                <p:ph sz="quarter" idx="10"/>
+              </p:nvPr>
+            </p:nvSpPr>
+            <p:spPr>
+              <a:blipFill>
+                <a:blip r:embed="rId2"/>
+                <a:stretch>
+                  <a:fillRect l="-1742" t="-730"/>
+                </a:stretch>
+              </a:blipFill>
+            </p:spPr>
+            <p:txBody>
+              <a:bodyPr/>
+              <a:lstStyle/>
+              <a:p>
+                <a:r>
+                  <a:rPr lang="en-US">
+                    <a:noFill/>
+                  </a:rPr>
+                  <a:t> </a:t>
+                </a:r>
+              </a:p>
+            </p:txBody>
+          </p:sp>
+        </mc:Fallback>
+      </mc:AlternateContent>
     </p:spTree>
     <p:extLst>
       <p:ext uri="{BB962C8B-B14F-4D97-AF65-F5344CB8AC3E}">
@@ -7442,8 +7843,8 @@
           </a:p>
         </p:txBody>
       </p:sp>
-      <mc:AlternateContent xmlns:mc="http://schemas.openxmlformats.org/markup-compatibility/2006">
-        <mc:Choice xmlns:a14="http://schemas.microsoft.com/office/drawing/2010/main" Requires="a14">
+      <mc:AlternateContent xmlns:mc="http://schemas.openxmlformats.org/markup-compatibility/2006" xmlns:a14="http://schemas.microsoft.com/office/drawing/2010/main">
+        <mc:Choice Requires="a14">
           <p:sp>
             <p:nvSpPr>
               <p:cNvPr id="3" name="Content Placeholder 2">
@@ -7536,7 +7937,7 @@
             </p:txBody>
           </p:sp>
         </mc:Choice>
-        <mc:Fallback>
+        <mc:Fallback xmlns="">
           <p:sp>
             <p:nvSpPr>
               <p:cNvPr id="3" name="Content Placeholder 2">
@@ -7865,8 +8266,8 @@
           </a:p>
         </p:txBody>
       </p:sp>
-      <mc:AlternateContent xmlns:mc="http://schemas.openxmlformats.org/markup-compatibility/2006">
-        <mc:Choice xmlns:a14="http://schemas.microsoft.com/office/drawing/2010/main" Requires="a14">
+      <mc:AlternateContent xmlns:mc="http://schemas.openxmlformats.org/markup-compatibility/2006" xmlns:a14="http://schemas.microsoft.com/office/drawing/2010/main">
+        <mc:Choice Requires="a14">
           <p:sp>
             <p:nvSpPr>
               <p:cNvPr id="3" name="Content Placeholder 2">
@@ -7984,7 +8385,7 @@
             </p:txBody>
           </p:sp>
         </mc:Choice>
-        <mc:Fallback>
+        <mc:Fallback xmlns="">
           <p:sp>
             <p:nvSpPr>
               <p:cNvPr id="3" name="Content Placeholder 2">
@@ -8227,8 +8628,8 @@
           </a:p>
         </p:txBody>
       </p:sp>
-      <mc:AlternateContent xmlns:mc="http://schemas.openxmlformats.org/markup-compatibility/2006">
-        <mc:Choice xmlns:a14="http://schemas.microsoft.com/office/drawing/2010/main" Requires="a14">
+      <mc:AlternateContent xmlns:mc="http://schemas.openxmlformats.org/markup-compatibility/2006" xmlns:a14="http://schemas.microsoft.com/office/drawing/2010/main">
+        <mc:Choice Requires="a14">
           <p:sp>
             <p:nvSpPr>
               <p:cNvPr id="3" name="Content Placeholder 2">
@@ -8952,13 +9353,7 @@
                       <a:rPr lang="en-US" sz="1600" i="1">
                         <a:latin typeface="Cambria Math" panose="02040503050406030204" pitchFamily="18" charset="0"/>
                       </a:rPr>
-                      <m:t>/</m:t>
-                    </m:r>
-                    <m:r>
-                      <a:rPr lang="en-US" sz="1600" i="1">
-                        <a:latin typeface="Cambria Math" panose="02040503050406030204" pitchFamily="18" charset="0"/>
-                      </a:rPr>
-                      <m:t>(</m:t>
+                      <m:t>/(</m:t>
                     </m:r>
                     <m:r>
                       <a:rPr lang="en-US" sz="1600" i="1">
@@ -9045,7 +9440,7 @@
             </p:txBody>
           </p:sp>
         </mc:Choice>
-        <mc:Fallback>
+        <mc:Fallback xmlns="">
           <p:sp>
             <p:nvSpPr>
               <p:cNvPr id="3" name="Content Placeholder 2">
@@ -9150,8 +9545,8 @@
           </a:p>
         </p:txBody>
       </p:sp>
-      <mc:AlternateContent xmlns:mc="http://schemas.openxmlformats.org/markup-compatibility/2006">
-        <mc:Choice xmlns:a14="http://schemas.microsoft.com/office/drawing/2010/main" Requires="a14">
+      <mc:AlternateContent xmlns:mc="http://schemas.openxmlformats.org/markup-compatibility/2006" xmlns:a14="http://schemas.microsoft.com/office/drawing/2010/main">
+        <mc:Choice Requires="a14">
           <p:sp>
             <p:nvSpPr>
               <p:cNvPr id="4" name="Content Placeholder 3">
@@ -9250,7 +9645,7 @@
             </p:txBody>
           </p:sp>
         </mc:Choice>
-        <mc:Fallback>
+        <mc:Fallback xmlns="">
           <p:sp>
             <p:nvSpPr>
               <p:cNvPr id="4" name="Content Placeholder 3">
@@ -9384,8 +9779,8 @@
           </a:p>
         </p:txBody>
       </p:sp>
-      <mc:AlternateContent xmlns:mc="http://schemas.openxmlformats.org/markup-compatibility/2006">
-        <mc:Choice xmlns:a14="http://schemas.microsoft.com/office/drawing/2010/main" Requires="a14">
+      <mc:AlternateContent xmlns:mc="http://schemas.openxmlformats.org/markup-compatibility/2006" xmlns:a14="http://schemas.microsoft.com/office/drawing/2010/main">
+        <mc:Choice Requires="a14">
           <p:sp>
             <p:nvSpPr>
               <p:cNvPr id="8" name="Content Placeholder 7">
@@ -9571,7 +9966,7 @@
                         <m:sSub>
                           <m:sSubPr>
                             <m:ctrlPr>
-                              <a:rPr lang="en-US" b="0" smtClean="0">
+                              <a:rPr lang="en-US" b="0" i="1" smtClean="0">
                                 <a:latin typeface="Cambria Math" panose="02040503050406030204" pitchFamily="18" charset="0"/>
                               </a:rPr>
                             </m:ctrlPr>
@@ -9920,13 +10315,7 @@
                                     <a:rPr lang="en-US" i="1">
                                       <a:latin typeface="Cambria Math" panose="02040503050406030204" pitchFamily="18" charset="0"/>
                                     </a:rPr>
-                                    <m:t>)</m:t>
-                                  </m:r>
-                                  <m:r>
-                                    <a:rPr lang="en-US" i="1">
-                                      <a:latin typeface="Cambria Math" panose="02040503050406030204" pitchFamily="18" charset="0"/>
-                                    </a:rPr>
-                                    <m:t>/</m:t>
+                                    <m:t>)/</m:t>
                                   </m:r>
                                   <m:r>
                                     <a:rPr lang="en-US" i="1">
@@ -10378,7 +10767,7 @@
             </p:txBody>
           </p:sp>
         </mc:Choice>
-        <mc:Fallback>
+        <mc:Fallback xmlns="">
           <p:sp>
             <p:nvSpPr>
               <p:cNvPr id="8" name="Content Placeholder 7">
@@ -10452,8 +10841,8 @@
           </a:prstGeom>
         </p:spPr>
       </p:pic>
-      <mc:AlternateContent xmlns:mc="http://schemas.openxmlformats.org/markup-compatibility/2006">
-        <mc:Choice xmlns:a14="http://schemas.microsoft.com/office/drawing/2010/main" Requires="a14">
+      <mc:AlternateContent xmlns:mc="http://schemas.openxmlformats.org/markup-compatibility/2006" xmlns:a14="http://schemas.microsoft.com/office/drawing/2010/main">
+        <mc:Choice Requires="a14">
           <p:sp>
             <p:nvSpPr>
               <p:cNvPr id="7" name="TextBox 6">
@@ -10555,7 +10944,7 @@
             </p:txBody>
           </p:sp>
         </mc:Choice>
-        <mc:Fallback>
+        <mc:Fallback xmlns="">
           <p:sp>
             <p:nvSpPr>
               <p:cNvPr id="7" name="TextBox 6">
@@ -10661,8 +11050,8 @@
           </a:p>
         </p:txBody>
       </p:sp>
-      <mc:AlternateContent xmlns:mc="http://schemas.openxmlformats.org/markup-compatibility/2006">
-        <mc:Choice xmlns:a14="http://schemas.microsoft.com/office/drawing/2010/main" Requires="a14">
+      <mc:AlternateContent xmlns:mc="http://schemas.openxmlformats.org/markup-compatibility/2006" xmlns:a14="http://schemas.microsoft.com/office/drawing/2010/main">
+        <mc:Choice Requires="a14">
           <p:sp>
             <p:nvSpPr>
               <p:cNvPr id="3" name="Content Placeholder 2">
@@ -11173,7 +11562,7 @@
                               <m:sSup>
                                 <m:sSupPr>
                                   <m:ctrlPr>
-                                    <a:rPr lang="en-US" b="0" i="0" smtClean="0">
+                                    <a:rPr lang="en-US" b="0" i="1" smtClean="0">
                                       <a:latin typeface="Cambria Math" panose="02040503050406030204" pitchFamily="18" charset="0"/>
                                     </a:rPr>
                                   </m:ctrlPr>
@@ -11504,7 +11893,7 @@
             </p:txBody>
           </p:sp>
         </mc:Choice>
-        <mc:Fallback>
+        <mc:Fallback xmlns="">
           <p:sp>
             <p:nvSpPr>
               <p:cNvPr id="3" name="Content Placeholder 2">
@@ -11717,8 +12106,8 @@
           </a:p>
         </p:txBody>
       </p:sp>
-      <mc:AlternateContent xmlns:mc="http://schemas.openxmlformats.org/markup-compatibility/2006">
-        <mc:Choice xmlns:a14="http://schemas.microsoft.com/office/drawing/2010/main" Requires="a14">
+      <mc:AlternateContent xmlns:mc="http://schemas.openxmlformats.org/markup-compatibility/2006" xmlns:a14="http://schemas.microsoft.com/office/drawing/2010/main">
+        <mc:Choice Requires="a14">
           <p:sp>
             <p:nvSpPr>
               <p:cNvPr id="3" name="Content Placeholder 2">
@@ -12035,7 +12424,7 @@
                               <m:sSup>
                                 <m:sSupPr>
                                   <m:ctrlPr>
-                                    <a:rPr lang="en-US" b="0" i="0" smtClean="0">
+                                    <a:rPr lang="en-US" b="0" i="1" smtClean="0">
                                       <a:latin typeface="Cambria Math" panose="02040503050406030204" pitchFamily="18" charset="0"/>
                                     </a:rPr>
                                   </m:ctrlPr>
@@ -12517,7 +12906,7 @@
             </p:txBody>
           </p:sp>
         </mc:Choice>
-        <mc:Fallback>
+        <mc:Fallback xmlns="">
           <p:sp>
             <p:nvSpPr>
               <p:cNvPr id="3" name="Content Placeholder 2">

</xml_diff>

<commit_message>
Neutrons v1.6.5. Figures for article 'TmVO4_model_nematicity'. Modified (8 8 0) peak vs H at 0.6K.
</commit_message>
<xml_diff>
--- a/Matlab_data_analysis/Cp_analysis/AnalyzeCpDoping/Cp_random_strains/TmVO4_Cp_random_strains_analysis_notes.pptx
+++ b/Matlab_data_analysis/Cp_analysis/AnalyzeCpDoping/Cp_random_strains/TmVO4_Cp_random_strains_analysis_notes.pptx
@@ -6,10 +6,10 @@
     <p:sldMasterId id="2147483699" r:id="rId2"/>
   </p:sldMasterIdLst>
   <p:notesMasterIdLst>
-    <p:notesMasterId r:id="rId16"/>
+    <p:notesMasterId r:id="rId17"/>
   </p:notesMasterIdLst>
   <p:handoutMasterIdLst>
-    <p:handoutMasterId r:id="rId17"/>
+    <p:handoutMasterId r:id="rId18"/>
   </p:handoutMasterIdLst>
   <p:sldIdLst>
     <p:sldId id="304" r:id="rId3"/>
@@ -25,6 +25,7 @@
     <p:sldId id="326" r:id="rId13"/>
     <p:sldId id="324" r:id="rId14"/>
     <p:sldId id="327" r:id="rId15"/>
+    <p:sldId id="328" r:id="rId16"/>
   </p:sldIdLst>
   <p:sldSz cx="9144000" cy="6858000" type="screen4x3"/>
   <p:notesSz cx="6858000" cy="9144000"/>
@@ -283,7 +284,7 @@
               <a:pPr>
                 <a:defRPr/>
               </a:pPr>
-              <a:t>2019-04-15</a:t>
+              <a:t>2019-04-24</a:t>
             </a:fld>
             <a:endParaRPr lang="en-US" altLang="en-US"/>
           </a:p>
@@ -521,7 +522,7 @@
               <a:pPr>
                 <a:defRPr/>
               </a:pPr>
-              <a:t>2019-04-15</a:t>
+              <a:t>2019-04-24</a:t>
             </a:fld>
             <a:endParaRPr lang="en-US" altLang="en-US"/>
           </a:p>
@@ -988,14 +989,14 @@
           </a:ln>
           <a:extLst>
             <a:ext uri="{909E8E84-426E-40dd-AFC4-6F175D3DCCD1}">
-              <a14:hiddenFill xmlns="" xmlns:a14="http://schemas.microsoft.com/office/drawing/2010/main">
+              <a14:hiddenFill xmlns:a14="http://schemas.microsoft.com/office/drawing/2010/main" xmlns="">
                 <a:solidFill>
                   <a:srgbClr val="FFFFFF"/>
                 </a:solidFill>
               </a14:hiddenFill>
             </a:ext>
             <a:ext uri="{91240B29-F687-4f45-9708-019B960494DF}">
-              <a14:hiddenLine xmlns="" xmlns:a14="http://schemas.microsoft.com/office/drawing/2010/main" w="9525">
+              <a14:hiddenLine xmlns:a14="http://schemas.microsoft.com/office/drawing/2010/main" xmlns="" w="9525">
                 <a:solidFill>
                   <a:srgbClr val="000000"/>
                 </a:solidFill>
@@ -4076,14 +4077,14 @@
           </a:ln>
           <a:extLst>
             <a:ext uri="{909E8E84-426E-40dd-AFC4-6F175D3DCCD1}">
-              <a14:hiddenFill xmlns="" xmlns:a14="http://schemas.microsoft.com/office/drawing/2010/main">
+              <a14:hiddenFill xmlns:a14="http://schemas.microsoft.com/office/drawing/2010/main" xmlns="">
                 <a:solidFill>
                   <a:srgbClr val="FFFFFF"/>
                 </a:solidFill>
               </a14:hiddenFill>
             </a:ext>
             <a:ext uri="{91240B29-F687-4f45-9708-019B960494DF}">
-              <a14:hiddenLine xmlns="" xmlns:a14="http://schemas.microsoft.com/office/drawing/2010/main" w="9525">
+              <a14:hiddenLine xmlns:a14="http://schemas.microsoft.com/office/drawing/2010/main" xmlns="" w="9525">
                 <a:solidFill>
                   <a:srgbClr val="000000"/>
                 </a:solidFill>
@@ -7031,14 +7032,14 @@
           </a:ln>
           <a:extLst>
             <a:ext uri="{909E8E84-426E-40dd-AFC4-6F175D3DCCD1}">
-              <a14:hiddenFill xmlns="" xmlns:a14="http://schemas.microsoft.com/office/drawing/2010/main">
+              <a14:hiddenFill xmlns:a14="http://schemas.microsoft.com/office/drawing/2010/main" xmlns="">
                 <a:solidFill>
                   <a:srgbClr val="FFFFFF"/>
                 </a:solidFill>
               </a14:hiddenFill>
             </a:ext>
             <a:ext uri="{91240B29-F687-4f45-9708-019B960494DF}">
-              <a14:hiddenLine xmlns="" xmlns:a14="http://schemas.microsoft.com/office/drawing/2010/main" w="9525">
+              <a14:hiddenLine xmlns:a14="http://schemas.microsoft.com/office/drawing/2010/main" xmlns="" w="9525">
                 <a:solidFill>
                   <a:srgbClr val="000000"/>
                 </a:solidFill>
@@ -9732,8 +9733,8 @@
           </a:p>
         </p:txBody>
       </p:sp>
-      <mc:AlternateContent xmlns:mc="http://schemas.openxmlformats.org/markup-compatibility/2006">
-        <mc:Choice xmlns:a14="http://schemas.microsoft.com/office/drawing/2010/main" Requires="a14">
+      <mc:AlternateContent xmlns:mc="http://schemas.openxmlformats.org/markup-compatibility/2006" xmlns:a14="http://schemas.microsoft.com/office/drawing/2010/main">
+        <mc:Choice Requires="a14">
           <p:sp>
             <p:nvSpPr>
               <p:cNvPr id="3" name="Content Placeholder 2">
@@ -11562,7 +11563,7 @@
             </p:txBody>
           </p:sp>
         </mc:Choice>
-        <mc:Fallback>
+        <mc:Fallback xmlns="">
           <p:sp>
             <p:nvSpPr>
               <p:cNvPr id="3" name="Content Placeholder 2">
@@ -11610,6 +11611,155 @@
     <p:extLst>
       <p:ext uri="{BB962C8B-B14F-4D97-AF65-F5344CB8AC3E}">
         <p14:creationId xmlns:p14="http://schemas.microsoft.com/office/powerpoint/2010/main" val="97299663"/>
+      </p:ext>
+    </p:extLst>
+  </p:cSld>
+  <p:clrMapOvr>
+    <a:masterClrMapping/>
+  </p:clrMapOvr>
+  <p:transition spd="slow">
+    <p:fade/>
+  </p:transition>
+</p:sld>
+</file>
+
+<file path=ppt/slides/slide14.xml><?xml version="1.0" encoding="utf-8"?>
+<p:sld xmlns:a="http://schemas.openxmlformats.org/drawingml/2006/main" xmlns:r="http://schemas.openxmlformats.org/officeDocument/2006/relationships" xmlns:p="http://schemas.openxmlformats.org/presentationml/2006/main">
+  <p:cSld>
+    <p:spTree>
+      <p:nvGrpSpPr>
+        <p:cNvPr id="1" name=""/>
+        <p:cNvGrpSpPr/>
+        <p:nvPr/>
+      </p:nvGrpSpPr>
+      <p:grpSpPr>
+        <a:xfrm>
+          <a:off x="0" y="0"/>
+          <a:ext cx="0" cy="0"/>
+          <a:chOff x="0" y="0"/>
+          <a:chExt cx="0" cy="0"/>
+        </a:xfrm>
+      </p:grpSpPr>
+      <p:sp>
+        <p:nvSpPr>
+          <p:cNvPr id="2" name="Title 1">
+            <a:extLst>
+              <a:ext uri="{FF2B5EF4-FFF2-40B4-BE49-F238E27FC236}">
+                <a16:creationId xmlns:a16="http://schemas.microsoft.com/office/drawing/2014/main" id="{9CCFC93D-7544-402F-A28B-3EADE2CA00BB}"/>
+              </a:ext>
+            </a:extLst>
+          </p:cNvPr>
+          <p:cNvSpPr>
+            <a:spLocks noGrp="1"/>
+          </p:cNvSpPr>
+          <p:nvPr>
+            <p:ph type="title"/>
+          </p:nvPr>
+        </p:nvSpPr>
+        <p:spPr/>
+        <p:txBody>
+          <a:bodyPr/>
+          <a:lstStyle/>
+          <a:p>
+            <a:r>
+              <a:rPr lang="en-US" dirty="0"/>
+              <a:t>To do as of 2019-04-24</a:t>
+            </a:r>
+          </a:p>
+        </p:txBody>
+      </p:sp>
+      <p:sp>
+        <p:nvSpPr>
+          <p:cNvPr id="3" name="Content Placeholder 2">
+            <a:extLst>
+              <a:ext uri="{FF2B5EF4-FFF2-40B4-BE49-F238E27FC236}">
+                <a16:creationId xmlns:a16="http://schemas.microsoft.com/office/drawing/2014/main" id="{35D22705-0688-41AE-B507-01F62D56CD2D}"/>
+              </a:ext>
+            </a:extLst>
+          </p:cNvPr>
+          <p:cNvSpPr>
+            <a:spLocks noGrp="1"/>
+          </p:cNvSpPr>
+          <p:nvPr>
+            <p:ph sz="quarter" idx="10"/>
+          </p:nvPr>
+        </p:nvSpPr>
+        <p:spPr/>
+        <p:txBody>
+          <a:bodyPr/>
+          <a:lstStyle/>
+          <a:p>
+            <a:pPr>
+              <a:buFont typeface="Arial" panose="020B0604020202020204" pitchFamily="34" charset="0"/>
+              <a:buChar char="•"/>
+            </a:pPr>
+            <a:r>
+              <a:rPr lang="en-US" dirty="0"/>
+              <a:t>Compute </a:t>
+            </a:r>
+            <a:r>
+              <a:rPr lang="en-US" dirty="0" err="1"/>
+              <a:t>Sz</a:t>
+            </a:r>
+            <a:r>
+              <a:rPr lang="en-US" dirty="0"/>
+              <a:t> for negative offset strain using a starting point of -1 for </a:t>
+            </a:r>
+            <a:r>
+              <a:rPr lang="en-US" dirty="0" err="1"/>
+              <a:t>fzero</a:t>
+            </a:r>
+            <a:r>
+              <a:rPr lang="en-US" dirty="0"/>
+              <a:t> </a:t>
+            </a:r>
+          </a:p>
+          <a:p>
+            <a:pPr lvl="2">
+              <a:buFont typeface="Arial" panose="020B0604020202020204" pitchFamily="34" charset="0"/>
+              <a:buChar char="•"/>
+            </a:pPr>
+            <a:r>
+              <a:rPr lang="en-US" dirty="0"/>
+              <a:t>Check that the result is the same as for positive offset strain with a starting point of +1</a:t>
+            </a:r>
+          </a:p>
+          <a:p>
+            <a:pPr>
+              <a:buFont typeface="Arial" panose="020B0604020202020204" pitchFamily="34" charset="0"/>
+              <a:buChar char="•"/>
+            </a:pPr>
+            <a:r>
+              <a:rPr lang="en-US" dirty="0"/>
+              <a:t>compare Delta_0 extracted from Gehring et al with "Schottky" distribution width</a:t>
+            </a:r>
+          </a:p>
+          <a:p>
+            <a:pPr>
+              <a:buFont typeface="Arial" panose="020B0604020202020204" pitchFamily="34" charset="0"/>
+              <a:buChar char="•"/>
+            </a:pPr>
+            <a:r>
+              <a:rPr lang="en-US" dirty="0"/>
+              <a:t>Fit YTmVO4 data with x&gt;xc with distribution of Schottky anomalies and extract values of mu and sigma</a:t>
+            </a:r>
+          </a:p>
+          <a:p>
+            <a:pPr>
+              <a:buFont typeface="Arial" panose="020B0604020202020204" pitchFamily="34" charset="0"/>
+              <a:buChar char="•"/>
+            </a:pPr>
+            <a:r>
+              <a:rPr lang="en-US" dirty="0"/>
+              <a:t>Calculate critical strain and relation to splitting</a:t>
+            </a:r>
+          </a:p>
+        </p:txBody>
+      </p:sp>
+    </p:spTree>
+    <p:extLst>
+      <p:ext uri="{BB962C8B-B14F-4D97-AF65-F5344CB8AC3E}">
+        <p14:creationId xmlns:p14="http://schemas.microsoft.com/office/powerpoint/2010/main" val="4290358799"/>
       </p:ext>
     </p:extLst>
   </p:cSld>

</xml_diff>